<commit_message>
notebook 04 signoff + pres tweaks
</commit_message>
<xml_diff>
--- a/presentation/Recidivism.pptx
+++ b/presentation/Recidivism.pptx
@@ -41,7 +41,7 @@
       <p:boldItalic r:id="rId27"/>
     </p:embeddedFont>
     <p:embeddedFont>
-      <p:font typeface="Lexend Deca" pitchFamily="2" charset="77"/>
+      <p:font typeface="Lexend Deca" panose="020B0604020202020204" charset="0"/>
       <p:regular r:id="rId28"/>
       <p:bold r:id="rId29"/>
     </p:embeddedFont>
@@ -9641,7 +9641,7 @@
         <p:spPr>
           <a:xfrm>
             <a:off x="6068471" y="1292320"/>
-            <a:ext cx="2707341" cy="3293209"/>
+            <a:ext cx="2707341" cy="2800767"/>
           </a:xfrm>
           <a:prstGeom prst="rect">
             <a:avLst/>
@@ -9698,7 +9698,7 @@
                 <a:ea typeface="Lato" panose="020F0502020204030203" pitchFamily="34" charset="0"/>
                 <a:cs typeface="Lato" panose="020F0502020204030203" pitchFamily="34" charset="0"/>
               </a:rPr>
-              <a:t>Best performing model: Stacked model using Random Forest, Gradient Boost, and Logistic Regression,</a:t>
+              <a:t>Best performing model: FNN with layers of 84, 64, and 32 neurons,</a:t>
             </a:r>
           </a:p>
           <a:p>
@@ -10238,7 +10238,7 @@
                 <a:ea typeface="Lato" panose="020F0502020204030203" pitchFamily="34" charset="0"/>
                 <a:cs typeface="Lato" panose="020F0502020204030203" pitchFamily="34" charset="0"/>
               </a:rPr>
-              <a:t>Baseline accuracy: 0.59</a:t>
+              <a:t>Baseline accuracy: 0.60</a:t>
             </a:r>
           </a:p>
           <a:p>
@@ -10532,7 +10532,7 @@
                 <a:ea typeface="Lato" panose="020F0502020204030203" pitchFamily="34" charset="0"/>
                 <a:cs typeface="Lato" panose="020F0502020204030203" pitchFamily="34" charset="0"/>
               </a:rPr>
-              <a:t>In theory, yes. Our neural network model scored 88% in test accuracy, a 27% increase from the baseline.</a:t>
+              <a:t>In theory, yes. Our criminal history model scored 88% in test accuracy, a 27% increase from the baseline.</a:t>
             </a:r>
           </a:p>
           <a:p>
@@ -15389,7 +15389,7 @@
               <a:rPr lang="en-US" sz="1800" b="1" dirty="0">
                 <a:latin typeface="Lato" panose="020F0502020204030204" pitchFamily="34" charset="0"/>
               </a:rPr>
-              <a:t>Florida: 11,000 observations with 25 features</a:t>
+              <a:t>Florida: 11,000 observations with 34 features</a:t>
             </a:r>
           </a:p>
           <a:p>

</xml_diff>